<commit_message>
Update demo showcase with 3 new layout variants
- 3b: Comparison (image left, text right)
- 4b: Title + Image (top-bottom arrangement)
- 4c: Four-quadrant diagonal (equal-size quadrants)
- Updated revealjs slides and PPTX download
- Added stock images for new slides
- Speaker notes with image source attribution

Co-Authored-By: Claude Opus 4.5 <noreply@anthropic.com>
</commit_message>
<xml_diff>
--- a/assets/demos/demo-layouts.pptx
+++ b/assets/demos/demo-layouts.pptx
@@ -5,7 +5,7 @@
     <p:sldMasterId id="2147483648" r:id="rId1"/>
   </p:sldMasterIdLst>
   <p:notesMasterIdLst>
-    <p:notesMasterId r:id="rId10"/>
+    <p:notesMasterId r:id="rId13"/>
   </p:notesMasterIdLst>
   <p:sldIdLst>
     <p:sldId id="256" r:id="rId2"/>
@@ -16,6 +16,9 @@
     <p:sldId id="261" r:id="rId7"/>
     <p:sldId id="262" r:id="rId8"/>
     <p:sldId id="263" r:id="rId9"/>
+    <p:sldId id="264" r:id="rId10"/>
+    <p:sldId id="265" r:id="rId11"/>
+    <p:sldId id="266" r:id="rId12"/>
   </p:sldIdLst>
   <p:sldSz cx="9144000" cy="5143500" type="screen16x9"/>
   <p:notesSz cx="6858000" cy="9144000"/>
@@ -564,6 +567,88 @@
 </p:notes>
 </file>
 
+<file path=ppt/notesSlides/notesSlide10.xml><?xml version="1.0" encoding="utf-8"?>
+<p:notes xmlns:a="http://schemas.openxmlformats.org/drawingml/2006/main" xmlns:r="http://schemas.openxmlformats.org/officeDocument/2006/relationships" xmlns:p="http://schemas.openxmlformats.org/presentationml/2006/main">
+  <p:cSld>
+    <p:spTree>
+      <p:nvGrpSpPr>
+        <p:cNvPr id="1" name=""/>
+        <p:cNvGrpSpPr/>
+        <p:nvPr/>
+      </p:nvGrpSpPr>
+      <p:grpSpPr>
+        <a:xfrm>
+          <a:off x="0" y="0"/>
+          <a:ext cx="0" cy="0"/>
+          <a:chOff x="0" y="0"/>
+          <a:chExt cx="0" cy="0"/>
+        </a:xfrm>
+      </p:grpSpPr>
+      <p:sp>
+        <p:nvSpPr>
+          <p:cNvPr id="2" name="Slide Image Placeholder 1"/>
+          <p:cNvSpPr>
+            <a:spLocks noGrp="1" noRot="1" noChangeAspect="1"/>
+          </p:cNvSpPr>
+          <p:nvPr>
+            <p:ph type="sldImg"/>
+          </p:nvPr>
+        </p:nvSpPr>
+        <p:spPr/>
+      </p:sp>
+      <p:sp>
+        <p:nvSpPr>
+          <p:cNvPr id="3" name="Notes Placeholder 2"/>
+          <p:cNvSpPr>
+            <a:spLocks noGrp="1"/>
+          </p:cNvSpPr>
+          <p:nvPr>
+            <p:ph type="body" idx="1"/>
+          </p:nvPr>
+        </p:nvSpPr>
+        <p:spPr/>
+        <p:txBody>
+          <a:bodyPr/>
+          <a:lstStyle/>
+          <a:p>
+            <a:pPr lvl="0" indent="0" marL="0">
+              <a:buNone/>
+            </a:pPr>
+            <a:r>
+              <a:rPr/>
+              <a:t>這張投影片本身使用「Two Content」layout，兩欄都是純文字列表。 所有影像素材皆為 AI 生成（模組內建 stock 素材庫），無外部版權問題。</a:t>
+            </a:r>
+          </a:p>
+        </p:txBody>
+      </p:sp>
+      <p:sp>
+        <p:nvSpPr>
+          <p:cNvPr id="4" name="Slide Number Placeholder 3"/>
+          <p:cNvSpPr>
+            <a:spLocks noGrp="1"/>
+          </p:cNvSpPr>
+          <p:nvPr>
+            <p:ph type="sldNum" sz="quarter" idx="10"/>
+          </p:nvPr>
+        </p:nvSpPr>
+        <p:spPr/>
+        <p:txBody>
+          <a:bodyPr/>
+          <a:lstStyle/>
+          <a:p>
+            <a:fld id="{18BDFEC3-8487-43E8-A154-7C12CBC1FFF2}" type="slidenum">
+              <a:rPr lang="en-US"/>
+              <a:t>11</a:t>
+            </a:fld>
+            <a:endParaRPr lang="en-US"/>
+          </a:p>
+        </p:txBody>
+      </p:sp>
+    </p:spTree>
+  </p:cSld>
+</p:notes>
+</file>
+
 <file path=ppt/notesSlides/notesSlide2.xml><?xml version="1.0" encoding="utf-8"?>
 <p:notes xmlns:a="http://schemas.openxmlformats.org/drawingml/2006/main" xmlns:r="http://schemas.openxmlformats.org/officeDocument/2006/relationships" xmlns:p="http://schemas.openxmlformats.org/presentationml/2006/main">
   <p:cSld>
@@ -698,6 +783,20 @@
               <a:t>Layout: Comparison。 觸發條件：兩欄中至少一欄包含「文字 + 非文字（圖片/表格）」。 每欄有獨立的標題列，適合做對比呈現。</a:t>
             </a:r>
           </a:p>
+          <a:p>
+            <a:pPr lvl="0" indent="0" marL="0">
+              <a:buNone/>
+            </a:pPr>
+          </a:p>
+          <a:p>
+            <a:pPr lvl="0" indent="0" marL="0">
+              <a:buNone/>
+            </a:pPr>
+            <a:r>
+              <a:rPr/>
+              <a:t>圖片來源：AI 生成影像（模組內建 stock 素材庫）。 circuit.jpg — AI 生成電路板意象圖。 robot.jpg — AI 生成機器人意象圖。</a:t>
+            </a:r>
+          </a:p>
         </p:txBody>
       </p:sp>
       <p:sp>
@@ -777,7 +876,21 @@
             </a:pPr>
             <a:r>
               <a:rPr/>
-              <a:t>Layout: Content with Caption。 觸發條件：非雙欄投影片中，文字段落後接圖片（或表格）。 左側放標題與說明文字，右側放大圖。</a:t>
+              <a:t>Layout: Comparison（左圖右文變體）。 觸發條件：兩欄各含「文字 + 非文字」，Pandoc 選用 Comparison layout。 左欄為圖片 + 標題，右欄為純文字內容。 postprocess.py 會修復垂直置中。</a:t>
+            </a:r>
+          </a:p>
+          <a:p>
+            <a:pPr lvl="0" indent="0" marL="0">
+              <a:buNone/>
+            </a:pPr>
+          </a:p>
+          <a:p>
+            <a:pPr lvl="0" indent="0" marL="0">
+              <a:buNone/>
+            </a:pPr>
+            <a:r>
+              <a:rPr/>
+              <a:t>圖片來源：AI 生成影像（模組內建 stock 素材庫）。 office-collab.jpg — AI 生成辦公室團隊協作場景。</a:t>
             </a:r>
           </a:p>
         </p:txBody>
@@ -859,7 +972,21 @@
             </a:pPr>
             <a:r>
               <a:rPr/>
-              <a:t>Layout: Blank + background-image。 觸發條件：投影片只有空白內容（non-breaking space），搭配 background-image 屬性。 整張投影片以全版背景圖呈現，適合視覺衝擊頁或章節過場。</a:t>
+              <a:t>Layout: Content with Caption。 觸發條件：非雙欄投影片中，文字段落後接圖片（或表格）。 Pandoc 自動將文字放左側標題區、圖片放右側內容區。</a:t>
+            </a:r>
+          </a:p>
+          <a:p>
+            <a:pPr lvl="0" indent="0" marL="0">
+              <a:buNone/>
+            </a:pPr>
+          </a:p>
+          <a:p>
+            <a:pPr lvl="0" indent="0" marL="0">
+              <a:buNone/>
+            </a:pPr>
+            <a:r>
+              <a:rPr/>
+              <a:t>圖片來源：AI 生成影像（模組內建 stock 素材庫）。 teamwork.jpg — AI 生成團隊合作意象圖。</a:t>
             </a:r>
           </a:p>
         </p:txBody>
@@ -941,7 +1068,21 @@
             </a:pPr>
             <a:r>
               <a:rPr/>
-              <a:t>Layout: Title and Content + background-image。 背景圖以 stretch 模式填滿投影片，文字疊在上方。 建議使用暗色背景圖或在模板中加半透明遮罩確保文字可讀。</a:t>
+              <a:t>Layout: Title and Content（圖片變體）。 觸發條件：標題後僅放圖片、無文字段落 → Pandoc 選用 Title and Content layout。 形成「上方標題 + 下方大圖」的視覺效果，與版面四a（Content with Caption）的左右配置不同。</a:t>
+            </a:r>
+          </a:p>
+          <a:p>
+            <a:pPr lvl="0" indent="0" marL="0">
+              <a:buNone/>
+            </a:pPr>
+          </a:p>
+          <a:p>
+            <a:pPr lvl="0" indent="0" marL="0">
+              <a:buNone/>
+            </a:pPr>
+            <a:r>
+              <a:rPr/>
+              <a:t>圖片來源：AI 生成影像（模組內建 stock 素材庫）。 team-meeting.jpg — AI 生成團隊會議場景。</a:t>
             </a:r>
           </a:p>
         </p:txBody>
@@ -1023,7 +1164,21 @@
             </a:pPr>
             <a:r>
               <a:rPr/>
-              <a:t>這張投影片本身使用「Two Content」layout，兩欄都是純文字列表。</a:t>
+              <a:t>Layout: Comparison（四象限變體）。 觸發條件：兩欄各含「文字 + 圖片」→ Comparison layout。 左欄：上文下圖；右欄：上圖下文 → 形成對角對稱排版。 Pandoc 的 Comparison layout 中每欄有兩個 placeholder（標題區 + 內容區）， 文字和圖片按原始順序分配到各 placeholder，形成視覺上的四象限效果。 postprocess.py 會修復垂直置中。</a:t>
+            </a:r>
+          </a:p>
+          <a:p>
+            <a:pPr lvl="0" indent="0" marL="0">
+              <a:buNone/>
+            </a:pPr>
+          </a:p>
+          <a:p>
+            <a:pPr lvl="0" indent="0" marL="0">
+              <a:buNone/>
+            </a:pPr>
+            <a:r>
+              <a:rPr/>
+              <a:t>圖片來源：AI 生成影像（模組內建 stock 素材庫）。 ai-chip.jpg — AI 生成晶片意象圖。 coding-screen.jpg — AI 生成程式碼畫面。</a:t>
             </a:r>
           </a:p>
         </p:txBody>
@@ -1046,6 +1201,198 @@
             <a:fld id="{18BDFEC3-8487-43E8-A154-7C12CBC1FFF2}" type="slidenum">
               <a:rPr lang="en-US"/>
               <a:t>8</a:t>
+            </a:fld>
+            <a:endParaRPr lang="en-US"/>
+          </a:p>
+        </p:txBody>
+      </p:sp>
+    </p:spTree>
+  </p:cSld>
+</p:notes>
+</file>
+
+<file path=ppt/notesSlides/notesSlide8.xml><?xml version="1.0" encoding="utf-8"?>
+<p:notes xmlns:a="http://schemas.openxmlformats.org/drawingml/2006/main" xmlns:r="http://schemas.openxmlformats.org/officeDocument/2006/relationships" xmlns:p="http://schemas.openxmlformats.org/presentationml/2006/main">
+  <p:cSld>
+    <p:spTree>
+      <p:nvGrpSpPr>
+        <p:cNvPr id="1" name=""/>
+        <p:cNvGrpSpPr/>
+        <p:nvPr/>
+      </p:nvGrpSpPr>
+      <p:grpSpPr>
+        <a:xfrm>
+          <a:off x="0" y="0"/>
+          <a:ext cx="0" cy="0"/>
+          <a:chOff x="0" y="0"/>
+          <a:chExt cx="0" cy="0"/>
+        </a:xfrm>
+      </p:grpSpPr>
+      <p:sp>
+        <p:nvSpPr>
+          <p:cNvPr id="2" name="Slide Image Placeholder 1"/>
+          <p:cNvSpPr>
+            <a:spLocks noGrp="1" noRot="1" noChangeAspect="1"/>
+          </p:cNvSpPr>
+          <p:nvPr>
+            <p:ph type="sldImg"/>
+          </p:nvPr>
+        </p:nvSpPr>
+        <p:spPr/>
+      </p:sp>
+      <p:sp>
+        <p:nvSpPr>
+          <p:cNvPr id="3" name="Notes Placeholder 2"/>
+          <p:cNvSpPr>
+            <a:spLocks noGrp="1"/>
+          </p:cNvSpPr>
+          <p:nvPr>
+            <p:ph type="body" idx="1"/>
+          </p:nvPr>
+        </p:nvSpPr>
+        <p:spPr/>
+        <p:txBody>
+          <a:bodyPr/>
+          <a:lstStyle/>
+          <a:p>
+            <a:pPr lvl="0" indent="0" marL="0">
+              <a:buNone/>
+            </a:pPr>
+            <a:r>
+              <a:rPr/>
+              <a:t>Layout: Blank + background-image。 觸發條件：投影片只有空白內容（non-breaking space），搭配 background-image 屬性。 整張投影片以全版背景圖呈現，適合視覺衝擊頁或章節過場。</a:t>
+            </a:r>
+          </a:p>
+          <a:p>
+            <a:pPr lvl="0" indent="0" marL="0">
+              <a:buNone/>
+            </a:pPr>
+          </a:p>
+          <a:p>
+            <a:pPr lvl="0" indent="0" marL="0">
+              <a:buNone/>
+            </a:pPr>
+            <a:r>
+              <a:rPr/>
+              <a:t>圖片來源：AI 生成影像（模組內建 stock 素材庫）。 ai-brain.jpg — AI 生成大腦 × 科技意象圖。</a:t>
+            </a:r>
+          </a:p>
+        </p:txBody>
+      </p:sp>
+      <p:sp>
+        <p:nvSpPr>
+          <p:cNvPr id="4" name="Slide Number Placeholder 3"/>
+          <p:cNvSpPr>
+            <a:spLocks noGrp="1"/>
+          </p:cNvSpPr>
+          <p:nvPr>
+            <p:ph type="sldNum" sz="quarter" idx="10"/>
+          </p:nvPr>
+        </p:nvSpPr>
+        <p:spPr/>
+        <p:txBody>
+          <a:bodyPr/>
+          <a:lstStyle/>
+          <a:p>
+            <a:fld id="{18BDFEC3-8487-43E8-A154-7C12CBC1FFF2}" type="slidenum">
+              <a:rPr lang="en-US"/>
+              <a:t>9</a:t>
+            </a:fld>
+            <a:endParaRPr lang="en-US"/>
+          </a:p>
+        </p:txBody>
+      </p:sp>
+    </p:spTree>
+  </p:cSld>
+</p:notes>
+</file>
+
+<file path=ppt/notesSlides/notesSlide9.xml><?xml version="1.0" encoding="utf-8"?>
+<p:notes xmlns:a="http://schemas.openxmlformats.org/drawingml/2006/main" xmlns:r="http://schemas.openxmlformats.org/officeDocument/2006/relationships" xmlns:p="http://schemas.openxmlformats.org/presentationml/2006/main">
+  <p:cSld>
+    <p:spTree>
+      <p:nvGrpSpPr>
+        <p:cNvPr id="1" name=""/>
+        <p:cNvGrpSpPr/>
+        <p:nvPr/>
+      </p:nvGrpSpPr>
+      <p:grpSpPr>
+        <a:xfrm>
+          <a:off x="0" y="0"/>
+          <a:ext cx="0" cy="0"/>
+          <a:chOff x="0" y="0"/>
+          <a:chExt cx="0" cy="0"/>
+        </a:xfrm>
+      </p:grpSpPr>
+      <p:sp>
+        <p:nvSpPr>
+          <p:cNvPr id="2" name="Slide Image Placeholder 1"/>
+          <p:cNvSpPr>
+            <a:spLocks noGrp="1" noRot="1" noChangeAspect="1"/>
+          </p:cNvSpPr>
+          <p:nvPr>
+            <p:ph type="sldImg"/>
+          </p:nvPr>
+        </p:nvSpPr>
+        <p:spPr/>
+      </p:sp>
+      <p:sp>
+        <p:nvSpPr>
+          <p:cNvPr id="3" name="Notes Placeholder 2"/>
+          <p:cNvSpPr>
+            <a:spLocks noGrp="1"/>
+          </p:cNvSpPr>
+          <p:nvPr>
+            <p:ph type="body" idx="1"/>
+          </p:nvPr>
+        </p:nvSpPr>
+        <p:spPr/>
+        <p:txBody>
+          <a:bodyPr/>
+          <a:lstStyle/>
+          <a:p>
+            <a:pPr lvl="0" indent="0" marL="0">
+              <a:buNone/>
+            </a:pPr>
+            <a:r>
+              <a:rPr/>
+              <a:t>Layout: Title and Content + background-image。 背景圖以 stretch 模式填滿投影片，文字疊在上方。 建議使用暗色背景圖或在模板中加半透明遮罩確保文字可讀。</a:t>
+            </a:r>
+          </a:p>
+          <a:p>
+            <a:pPr lvl="0" indent="0" marL="0">
+              <a:buNone/>
+            </a:pPr>
+          </a:p>
+          <a:p>
+            <a:pPr lvl="0" indent="0" marL="0">
+              <a:buNone/>
+            </a:pPr>
+            <a:r>
+              <a:rPr/>
+              <a:t>圖片來源：AI 生成影像（模組內建 stock 素材庫）。 collaboration.jpg — AI 生成協作意象圖。</a:t>
+            </a:r>
+          </a:p>
+        </p:txBody>
+      </p:sp>
+      <p:sp>
+        <p:nvSpPr>
+          <p:cNvPr id="4" name="Slide Number Placeholder 3"/>
+          <p:cNvSpPr>
+            <a:spLocks noGrp="1"/>
+          </p:cNvSpPr>
+          <p:nvPr>
+            <p:ph type="sldNum" sz="quarter" idx="10"/>
+          </p:nvPr>
+        </p:nvSpPr>
+        <p:spPr/>
+        <p:txBody>
+          <a:bodyPr/>
+          <a:lstStyle/>
+          <a:p>
+            <a:fld id="{18BDFEC3-8487-43E8-A154-7C12CBC1FFF2}" type="slidenum">
+              <a:rPr lang="en-US"/>
+              <a:t>10</a:t>
             </a:fld>
             <a:endParaRPr lang="en-US"/>
           </a:p>
@@ -6119,7 +6466,7 @@
             </a:pPr>
             <a:r>
               <a:rPr/>
-              <a:t>三層架構 — 五種版面展示</a:t>
+              <a:t>三層架構 — 八種版面展示</a:t>
             </a:r>
           </a:p>
         </p:txBody>
@@ -6180,7 +6527,296 @@
             </a:pPr>
             <a:r>
               <a:rPr/>
-              <a:t>2026-01-29</a:t>
+              <a:t>2026-01-30</a:t>
+            </a:r>
+          </a:p>
+        </p:txBody>
+      </p:sp>
+    </p:spTree>
+  </p:cSld>
+</p:sld>
+</file>
+
+<file path=ppt/slides/slide10.xml><?xml version="1.0" encoding="utf-8"?>
+<p:sld xmlns:a="http://schemas.openxmlformats.org/drawingml/2006/main" xmlns:r="http://schemas.openxmlformats.org/officeDocument/2006/relationships" xmlns:p="http://schemas.openxmlformats.org/presentationml/2006/main">
+  <p:cSld>
+    <p:bg>
+      <p:bgPr>
+        <a:blipFill dpi="0" rotWithShape="1">
+          <a:blip r:embed="rId3">
+            <a:lum/>
+          </a:blip>
+          <a:srcRect/>
+          <a:stretch>
+            <a:fillRect t="-9000" b="-9000"/>
+          </a:stretch>
+        </a:blipFill>
+        <a:effectsLst/>
+      </p:bgPr>
+    </p:bg>
+    <p:spTree>
+      <p:nvGrpSpPr>
+        <p:cNvPr id="1" name=""/>
+        <p:cNvGrpSpPr/>
+        <p:nvPr/>
+      </p:nvGrpSpPr>
+      <p:grpSpPr>
+        <a:xfrm>
+          <a:off x="0" y="0"/>
+          <a:ext cx="0" cy="0"/>
+          <a:chOff x="0" y="0"/>
+          <a:chExt cx="0" cy="0"/>
+        </a:xfrm>
+      </p:grpSpPr>
+      <p:sp>
+        <p:nvSpPr>
+          <p:cNvPr id="2" name="Title 1"/>
+          <p:cNvSpPr>
+            <a:spLocks noGrp="1"/>
+          </p:cNvSpPr>
+          <p:nvPr>
+            <p:ph type="title"/>
+          </p:nvPr>
+        </p:nvSpPr>
+        <p:spPr/>
+        <p:txBody>
+          <a:bodyPr/>
+          <a:lstStyle/>
+          <a:p>
+            <a:pPr lvl="0" indent="0" marL="0">
+              <a:buNone/>
+            </a:pPr>
+            <a:r>
+              <a:rPr/>
+              <a:t>版面五：背景圖 + 標題</a:t>
+            </a:r>
+          </a:p>
+        </p:txBody>
+      </p:sp>
+      <p:sp>
+        <p:nvSpPr>
+          <p:cNvPr id="3" name="Content Placeholder 2"/>
+          <p:cNvSpPr>
+            <a:spLocks noGrp="1"/>
+          </p:cNvSpPr>
+          <p:nvPr>
+            <p:ph idx="1"/>
+          </p:nvPr>
+        </p:nvSpPr>
+        <p:spPr/>
+        <p:txBody>
+          <a:bodyPr/>
+          <a:lstStyle/>
+          <a:p>
+            <a:pPr lvl="0" indent="0" marL="0">
+              <a:buNone/>
+            </a:pPr>
+            <a:r>
+              <a:rPr b="1"/>
+              <a:t>三層架構 — L1 · L2 · L3</a:t>
+            </a:r>
+          </a:p>
+          <a:p>
+            <a:pPr lvl="0" indent="0" marL="0">
+              <a:buNone/>
+            </a:pPr>
+            <a:r>
+              <a:rPr/>
+              <a:t>從「敢用」到「會用」到「持續進化」</a:t>
+            </a:r>
+          </a:p>
+        </p:txBody>
+      </p:sp>
+    </p:spTree>
+  </p:cSld>
+</p:sld>
+</file>
+
+<file path=ppt/slides/slide11.xml><?xml version="1.0" encoding="utf-8"?>
+<p:sld xmlns:a="http://schemas.openxmlformats.org/drawingml/2006/main" xmlns:r="http://schemas.openxmlformats.org/officeDocument/2006/relationships" xmlns:p="http://schemas.openxmlformats.org/presentationml/2006/main">
+  <p:cSld>
+    <p:spTree>
+      <p:nvGrpSpPr>
+        <p:cNvPr id="1" name=""/>
+        <p:cNvGrpSpPr/>
+        <p:nvPr/>
+      </p:nvGrpSpPr>
+      <p:grpSpPr>
+        <a:xfrm>
+          <a:off x="0" y="0"/>
+          <a:ext cx="0" cy="0"/>
+          <a:chOff x="0" y="0"/>
+          <a:chExt cx="0" cy="0"/>
+        </a:xfrm>
+      </p:grpSpPr>
+      <p:sp>
+        <p:nvSpPr>
+          <p:cNvPr id="2" name="Title 1"/>
+          <p:cNvSpPr>
+            <a:spLocks noGrp="1"/>
+          </p:cNvSpPr>
+          <p:nvPr>
+            <p:ph type="title"/>
+          </p:nvPr>
+        </p:nvSpPr>
+        <p:spPr/>
+        <p:txBody>
+          <a:bodyPr/>
+          <a:lstStyle/>
+          <a:p>
+            <a:pPr lvl="0" indent="0" marL="0">
+              <a:buNone/>
+            </a:pPr>
+            <a:r>
+              <a:rPr/>
+              <a:t>版面對照總結</a:t>
+            </a:r>
+          </a:p>
+        </p:txBody>
+      </p:sp>
+      <p:sp>
+        <p:nvSpPr>
+          <p:cNvPr id="3" name="Content Placeholder 2"/>
+          <p:cNvSpPr>
+            <a:spLocks noGrp="1"/>
+          </p:cNvSpPr>
+          <p:nvPr>
+            <p:ph idx="1" sz="half"/>
+          </p:nvPr>
+        </p:nvSpPr>
+        <p:spPr/>
+        <p:txBody>
+          <a:bodyPr/>
+          <a:lstStyle/>
+          <a:p>
+            <a:pPr lvl="0" indent="0" marL="0">
+              <a:buNone/>
+            </a:pPr>
+            <a:r>
+              <a:rPr b="1"/>
+              <a:t>Pandoc 自動選用的 Layout</a:t>
+            </a:r>
+          </a:p>
+          <a:p>
+            <a:pPr lvl="0"/>
+            <a:r>
+              <a:rPr b="1"/>
+              <a:t>Title and Content</a:t>
+            </a:r>
+            <a:r>
+              <a:rPr/>
+              <a:t> — 純文字條列 / 標題+圖片</a:t>
+            </a:r>
+          </a:p>
+          <a:p>
+            <a:pPr lvl="0"/>
+            <a:r>
+              <a:rPr b="1"/>
+              <a:t>Two Content</a:t>
+            </a:r>
+            <a:r>
+              <a:rPr/>
+              <a:t> — 雙欄純文字</a:t>
+            </a:r>
+          </a:p>
+          <a:p>
+            <a:pPr lvl="0"/>
+            <a:r>
+              <a:rPr b="1"/>
+              <a:t>Comparison</a:t>
+            </a:r>
+            <a:r>
+              <a:rPr/>
+              <a:t> — 雙欄含圖 / 左圖右文 / 四象限</a:t>
+            </a:r>
+          </a:p>
+          <a:p>
+            <a:pPr lvl="0"/>
+            <a:r>
+              <a:rPr b="1"/>
+              <a:t>Content with Caption</a:t>
+            </a:r>
+            <a:r>
+              <a:rPr/>
+              <a:t> — 文字 + 圖（左右配置）</a:t>
+            </a:r>
+          </a:p>
+          <a:p>
+            <a:pPr lvl="0"/>
+            <a:r>
+              <a:rPr b="1"/>
+              <a:t>Blank</a:t>
+            </a:r>
+            <a:r>
+              <a:rPr/>
+              <a:t> — 背景圖（無標題）</a:t>
+            </a:r>
+          </a:p>
+        </p:txBody>
+      </p:sp>
+      <p:sp>
+        <p:nvSpPr>
+          <p:cNvPr id="4" name="Content Placeholder 3"/>
+          <p:cNvSpPr>
+            <a:spLocks noGrp="1"/>
+          </p:cNvSpPr>
+          <p:nvPr>
+            <p:ph idx="2" sz="half"/>
+          </p:nvPr>
+        </p:nvSpPr>
+        <p:spPr/>
+        <p:txBody>
+          <a:bodyPr/>
+          <a:lstStyle/>
+          <a:p>
+            <a:pPr lvl="0" indent="0" marL="0">
+              <a:buNone/>
+            </a:pPr>
+            <a:r>
+              <a:rPr b="1"/>
+              <a:t>觸發條件與變體</a:t>
+            </a:r>
+          </a:p>
+          <a:p>
+            <a:pPr lvl="0"/>
+            <a:r>
+              <a:rPr/>
+              <a:t>只有文字 → Title and Content</a:t>
+            </a:r>
+          </a:p>
+          <a:p>
+            <a:pPr lvl="0"/>
+            <a:r>
+              <a:rPr/>
+              <a:t>標題 + 僅圖片 → Title and Content（上下配置）</a:t>
+            </a:r>
+          </a:p>
+          <a:p>
+            <a:pPr lvl="0"/>
+            <a:r>
+              <a:rPr/>
+              <a:t>columns + 純文字 → Two Content</a:t>
+            </a:r>
+          </a:p>
+          <a:p>
+            <a:pPr lvl="0"/>
+            <a:r>
+              <a:rPr/>
+              <a:t>columns + 文字+圖 → Comparison（多種變體）</a:t>
+            </a:r>
+          </a:p>
+          <a:p>
+            <a:pPr lvl="0"/>
+            <a:r>
+              <a:rPr/>
+              <a:t>文字後接圖片 → Content with Caption</a:t>
+            </a:r>
+          </a:p>
+          <a:p>
+            <a:pPr lvl="0"/>
+            <a:r>
+              <a:rPr/>
+              <a:t>background-image → Blank 或搭配標題</a:t>
             </a:r>
           </a:p>
         </p:txBody>
@@ -6495,7 +7131,7 @@
             </a:pPr>
             <a:r>
               <a:rPr/>
-              <a:t>版面三：Comparison</a:t>
+              <a:t>版面三a：Comparison（雙欄皆含圖）</a:t>
             </a:r>
           </a:p>
         </p:txBody>
@@ -6512,7 +7148,7 @@
         </p:nvSpPr>
         <p:spPr/>
         <p:txBody>
-          <a:bodyPr/>
+          <a:bodyPr anchor="ctr"/>
           <a:lstStyle/>
           <a:p>
             <a:pPr lvl="0" indent="0" marL="0">
@@ -6567,7 +7203,7 @@
         </p:nvSpPr>
         <p:spPr/>
         <p:txBody>
-          <a:bodyPr/>
+          <a:bodyPr anchor="ctr"/>
           <a:lstStyle/>
           <a:p>
             <a:pPr lvl="0" indent="0" marL="0">
@@ -6642,6 +7278,244 @@
             <p:ph type="title"/>
           </p:nvPr>
         </p:nvSpPr>
+        <p:spPr/>
+        <p:txBody>
+          <a:bodyPr/>
+          <a:lstStyle/>
+          <a:p>
+            <a:pPr lvl="0" indent="0" marL="0">
+              <a:buNone/>
+            </a:pPr>
+            <a:r>
+              <a:rPr/>
+              <a:t>版面三b：Comparison（左圖右文）</a:t>
+            </a:r>
+          </a:p>
+        </p:txBody>
+      </p:sp>
+      <p:sp>
+        <p:nvSpPr>
+          <p:cNvPr id="3" name="Text Placeholder 2"/>
+          <p:cNvSpPr>
+            <a:spLocks noGrp="1"/>
+          </p:cNvSpPr>
+          <p:nvPr>
+            <p:ph idx="1" type="body"/>
+          </p:nvPr>
+        </p:nvSpPr>
+        <p:spPr/>
+        <p:txBody>
+          <a:bodyPr anchor="ctr"/>
+          <a:lstStyle/>
+          <a:p>
+            <a:pPr lvl="0" indent="0" marL="0">
+              <a:buNone/>
+            </a:pPr>
+            <a:r>
+              <a:rPr b="1"/>
+              <a:t>團隊協作場景</a:t>
+            </a:r>
+          </a:p>
+        </p:txBody>
+      </p:sp>
+      <p:pic>
+        <p:nvPicPr>
+          <p:cNvPr descr="images/stock/office-collab.jpg" id="0" name="Picture 1"/>
+          <p:cNvPicPr>
+            <a:picLocks noGrp="1" noChangeAspect="1"/>
+          </p:cNvPicPr>
+          <p:nvPr/>
+        </p:nvPicPr>
+        <p:blipFill>
+          <a:blip r:embed="rId3"/>
+          <a:stretch>
+            <a:fillRect/>
+          </a:stretch>
+        </p:blipFill>
+        <p:spPr bwMode="auto">
+          <a:xfrm>
+            <a:off x="457200" y="1752600"/>
+            <a:ext cx="4038600" cy="2692400"/>
+          </a:xfrm>
+          <a:prstGeom prst="rect">
+            <a:avLst/>
+          </a:prstGeom>
+          <a:noFill/>
+          <a:ln w="9525">
+            <a:noFill/>
+            <a:headEnd/>
+            <a:tailEnd/>
+          </a:ln>
+        </p:spPr>
+      </p:pic>
+      <p:sp>
+        <p:nvSpPr>
+          <p:cNvPr id="5" name="Text Placeholder 4"/>
+          <p:cNvSpPr>
+            <a:spLocks noGrp="1"/>
+          </p:cNvSpPr>
+          <p:nvPr>
+            <p:ph idx="3" sz="quarter" type="body"/>
+          </p:nvPr>
+        </p:nvSpPr>
+        <p:spPr/>
+        <p:txBody>
+          <a:bodyPr anchor="ctr"/>
+          <a:lstStyle/>
+          <a:p>
+            <a:pPr lvl="0" indent="0" marL="0">
+              <a:buNone/>
+            </a:pPr>
+            <a:r>
+              <a:rPr b="1"/>
+              <a:t>AI Operation Lab 三層架構</a:t>
+            </a:r>
+          </a:p>
+        </p:txBody>
+      </p:sp>
+      <p:sp>
+        <p:nvSpPr>
+          <p:cNvPr id="6" name="Content Placeholder 5"/>
+          <p:cNvSpPr>
+            <a:spLocks noGrp="1"/>
+          </p:cNvSpPr>
+          <p:nvPr>
+            <p:ph sz="quarter" idx="4"/>
+          </p:nvPr>
+        </p:nvSpPr>
+        <p:spPr>
+          <a:xfrm>
+            <a:off x="4645026" y="1631156"/>
+            <a:ext cx="4041775" cy="2963466"/>
+          </a:xfrm>
+        </p:spPr>
+        <p:txBody>
+          <a:bodyPr anchor="ctr"/>
+          <a:lstStyle>
+            <a:lvl1pPr>
+              <a:defRPr sz="1600" b="0">
+                <a:solidFill>
+                  <a:srgbClr val="E0E0E0"/>
+                </a:solidFill>
+              </a:defRPr>
+            </a:lvl1pPr>
+            <a:lvl2pPr>
+              <a:defRPr sz="1600" b="0">
+                <a:solidFill>
+                  <a:srgbClr val="E0E0E0"/>
+                </a:solidFill>
+              </a:defRPr>
+            </a:lvl2pPr>
+            <a:lvl3pPr>
+              <a:defRPr sz="1600" b="0">
+                <a:solidFill>
+                  <a:srgbClr val="E0E0E0"/>
+                </a:solidFill>
+              </a:defRPr>
+            </a:lvl3pPr>
+            <a:lvl4pPr>
+              <a:defRPr sz="1600" b="0">
+                <a:solidFill>
+                  <a:srgbClr val="E0E0E0"/>
+                </a:solidFill>
+              </a:defRPr>
+            </a:lvl4pPr>
+            <a:lvl5pPr>
+              <a:defRPr sz="1600" b="0">
+                <a:solidFill>
+                  <a:srgbClr val="E0E0E0"/>
+                </a:solidFill>
+              </a:defRPr>
+            </a:lvl5pPr>
+            <a:lvl6pPr>
+              <a:defRPr sz="1200"/>
+            </a:lvl6pPr>
+            <a:lvl7pPr>
+              <a:defRPr sz="1200"/>
+            </a:lvl7pPr>
+            <a:lvl8pPr>
+              <a:defRPr sz="1200"/>
+            </a:lvl8pPr>
+            <a:lvl9pPr>
+              <a:defRPr sz="1200"/>
+            </a:lvl9pPr>
+          </a:lstStyle>
+          <a:p>
+            <a:pPr lvl="0"/>
+            <a:r>
+              <a:rPr b="1"/>
+              <a:t>L1</a:t>
+            </a:r>
+            <a:r>
+              <a:rPr/>
+              <a:t> 安全學習環境</a:t>
+            </a:r>
+          </a:p>
+          <a:p>
+            <a:pPr lvl="0"/>
+            <a:r>
+              <a:rPr b="1"/>
+              <a:t>L2</a:t>
+            </a:r>
+            <a:r>
+              <a:rPr/>
+              <a:t> AI 工作方法論</a:t>
+            </a:r>
+          </a:p>
+          <a:p>
+            <a:pPr lvl="0"/>
+            <a:r>
+              <a:rPr b="1"/>
+              <a:t>L3</a:t>
+            </a:r>
+            <a:r>
+              <a:rPr/>
+              <a:t> 組織進化路徑</a:t>
+            </a:r>
+          </a:p>
+          <a:p>
+            <a:pPr lvl="0" indent="0" marL="0">
+              <a:buNone/>
+            </a:pPr>
+            <a:r>
+              <a:rPr/>
+              <a:t>每一層建立在前一層的基礎上。</a:t>
+            </a:r>
+          </a:p>
+        </p:txBody>
+      </p:sp>
+    </p:spTree>
+  </p:cSld>
+</p:sld>
+</file>
+
+<file path=ppt/slides/slide6.xml><?xml version="1.0" encoding="utf-8"?>
+<p:sld xmlns:a="http://schemas.openxmlformats.org/drawingml/2006/main" xmlns:r="http://schemas.openxmlformats.org/officeDocument/2006/relationships" xmlns:p="http://schemas.openxmlformats.org/presentationml/2006/main">
+  <p:cSld>
+    <p:spTree>
+      <p:nvGrpSpPr>
+        <p:cNvPr id="1" name=""/>
+        <p:cNvGrpSpPr/>
+        <p:nvPr/>
+      </p:nvGrpSpPr>
+      <p:grpSpPr>
+        <a:xfrm>
+          <a:off x="0" y="0"/>
+          <a:ext cx="0" cy="0"/>
+          <a:chOff x="0" y="0"/>
+          <a:chExt cx="0" cy="0"/>
+        </a:xfrm>
+      </p:grpSpPr>
+      <p:sp>
+        <p:nvSpPr>
+          <p:cNvPr id="2" name="Title 1"/>
+          <p:cNvSpPr>
+            <a:spLocks noGrp="1"/>
+          </p:cNvSpPr>
+          <p:nvPr>
+            <p:ph type="title"/>
+          </p:nvPr>
+        </p:nvSpPr>
         <p:spPr>
           <a:xfrm>
             <a:off x="457201" y="204787"/>
@@ -6657,7 +7531,7 @@
             </a:pPr>
             <a:r>
               <a:rPr/>
-              <a:t>版面四：Content with Caption</a:t>
+              <a:t>版面四a：Content with Caption</a:t>
             </a:r>
           </a:p>
         </p:txBody>
@@ -6722,7 +7596,251 @@
 </p:sld>
 </file>
 
-<file path=ppt/slides/slide6.xml><?xml version="1.0" encoding="utf-8"?>
+<file path=ppt/slides/slide7.xml><?xml version="1.0" encoding="utf-8"?>
+<p:sld xmlns:a="http://schemas.openxmlformats.org/drawingml/2006/main" xmlns:r="http://schemas.openxmlformats.org/officeDocument/2006/relationships" xmlns:p="http://schemas.openxmlformats.org/presentationml/2006/main">
+  <p:cSld>
+    <p:spTree>
+      <p:nvGrpSpPr>
+        <p:cNvPr id="1" name=""/>
+        <p:cNvGrpSpPr/>
+        <p:nvPr/>
+      </p:nvGrpSpPr>
+      <p:grpSpPr>
+        <a:xfrm>
+          <a:off x="0" y="0"/>
+          <a:ext cx="0" cy="0"/>
+          <a:chOff x="0" y="0"/>
+          <a:chExt cx="0" cy="0"/>
+        </a:xfrm>
+      </p:grpSpPr>
+      <p:sp>
+        <p:nvSpPr>
+          <p:cNvPr id="2" name="Title 1"/>
+          <p:cNvSpPr>
+            <a:spLocks noGrp="1"/>
+          </p:cNvSpPr>
+          <p:nvPr>
+            <p:ph type="title"/>
+          </p:nvPr>
+        </p:nvSpPr>
+        <p:spPr/>
+        <p:txBody>
+          <a:bodyPr/>
+          <a:lstStyle/>
+          <a:p>
+            <a:pPr lvl="0" indent="0" marL="0">
+              <a:buNone/>
+            </a:pPr>
+            <a:r>
+              <a:rPr/>
+              <a:t>版面四b：Title and Content（標題 + 圖片）</a:t>
+            </a:r>
+          </a:p>
+        </p:txBody>
+      </p:sp>
+      <p:pic>
+        <p:nvPicPr>
+          <p:cNvPr descr="images/stock/team-meeting.jpg" id="0" name="Picture 1"/>
+          <p:cNvPicPr>
+            <a:picLocks noGrp="1" noChangeAspect="1"/>
+          </p:cNvPicPr>
+          <p:nvPr/>
+        </p:nvPicPr>
+        <p:blipFill>
+          <a:blip r:embed="rId3"/>
+          <a:stretch>
+            <a:fillRect/>
+          </a:stretch>
+        </p:blipFill>
+        <p:spPr bwMode="auto">
+          <a:xfrm>
+            <a:off x="2032000" y="1193800"/>
+            <a:ext cx="5080000" cy="3390900"/>
+          </a:xfrm>
+          <a:prstGeom prst="rect">
+            <a:avLst/>
+          </a:prstGeom>
+          <a:noFill/>
+          <a:ln w="9525">
+            <a:noFill/>
+            <a:headEnd/>
+            <a:tailEnd/>
+          </a:ln>
+        </p:spPr>
+      </p:pic>
+    </p:spTree>
+  </p:cSld>
+</p:sld>
+</file>
+
+<file path=ppt/slides/slide8.xml><?xml version="1.0" encoding="utf-8"?>
+<p:sld xmlns:a="http://schemas.openxmlformats.org/drawingml/2006/main" xmlns:r="http://schemas.openxmlformats.org/officeDocument/2006/relationships" xmlns:p="http://schemas.openxmlformats.org/presentationml/2006/main">
+  <p:cSld>
+    <p:spTree>
+      <p:nvGrpSpPr>
+        <p:cNvPr id="1" name=""/>
+        <p:cNvGrpSpPr/>
+        <p:nvPr/>
+      </p:nvGrpSpPr>
+      <p:grpSpPr>
+        <a:xfrm>
+          <a:off x="0" y="0"/>
+          <a:ext cx="0" cy="0"/>
+          <a:chOff x="0" y="0"/>
+          <a:chExt cx="0" cy="0"/>
+        </a:xfrm>
+      </p:grpSpPr>
+      <p:sp>
+        <p:nvSpPr>
+          <p:cNvPr id="2" name="Title 1"/>
+          <p:cNvSpPr>
+            <a:spLocks noGrp="1"/>
+          </p:cNvSpPr>
+          <p:nvPr>
+            <p:ph type="title"/>
+          </p:nvPr>
+        </p:nvSpPr>
+        <p:spPr/>
+        <p:txBody>
+          <a:bodyPr/>
+          <a:lstStyle/>
+          <a:p>
+            <a:pPr lvl="0" indent="0" marL="0">
+              <a:buNone/>
+            </a:pPr>
+            <a:r>
+              <a:rPr/>
+              <a:t>版面四c：Comparison（四象限對角圖文）</a:t>
+            </a:r>
+          </a:p>
+        </p:txBody>
+      </p:sp>
+      <p:sp>
+        <p:nvSpPr>
+          <p:cNvPr id="3" name="Text Placeholder 2"/>
+          <p:cNvSpPr>
+            <a:spLocks noGrp="1"/>
+          </p:cNvSpPr>
+          <p:nvPr>
+            <p:ph idx="1" type="body"/>
+          </p:nvPr>
+        </p:nvSpPr>
+        <p:spPr>
+          <a:xfrm>
+            <a:off x="457200" y="1100000"/>
+            <a:ext cx="4069080" cy="1779280"/>
+          </a:xfrm>
+        </p:spPr>
+        <p:txBody>
+          <a:bodyPr anchor="ctr"/>
+          <a:lstStyle/>
+          <a:p>
+            <a:pPr lvl="0" indent="0" marL="0">
+              <a:buNone/>
+            </a:pPr>
+            <a:r>
+              <a:rPr b="1"/>
+              <a:t>L1 安全學習環境</a:t>
+            </a:r>
+          </a:p>
+        </p:txBody>
+      </p:sp>
+      <p:pic>
+        <p:nvPicPr>
+          <p:cNvPr descr="images/stock/ai-chip.jpg" id="0" name="Picture 1"/>
+          <p:cNvPicPr>
+            <a:picLocks noGrp="1" noChangeAspect="1"/>
+          </p:cNvPicPr>
+          <p:nvPr/>
+        </p:nvPicPr>
+        <p:blipFill>
+          <a:blip r:embed="rId3"/>
+          <a:stretch>
+            <a:fillRect/>
+          </a:stretch>
+        </p:blipFill>
+        <p:spPr bwMode="auto">
+          <a:xfrm>
+            <a:off x="457200" y="2970720"/>
+            <a:ext cx="4069080" cy="1779280"/>
+          </a:xfrm>
+          <a:prstGeom prst="rect">
+            <a:avLst/>
+          </a:prstGeom>
+          <a:noFill/>
+          <a:ln w="9525">
+            <a:noFill/>
+            <a:headEnd/>
+            <a:tailEnd/>
+          </a:ln>
+        </p:spPr>
+      </p:pic>
+      <p:pic>
+        <p:nvPicPr>
+          <p:cNvPr descr="images/stock/coding-screen.jpg" id="0" name="Picture 1"/>
+          <p:cNvPicPr>
+            <a:picLocks noGrp="1" noChangeAspect="1"/>
+          </p:cNvPicPr>
+          <p:nvPr/>
+        </p:nvPicPr>
+        <p:blipFill>
+          <a:blip r:embed="rId4"/>
+          <a:stretch>
+            <a:fillRect/>
+          </a:stretch>
+        </p:blipFill>
+        <p:spPr bwMode="auto">
+          <a:xfrm>
+            <a:off x="4617720" y="1100000"/>
+            <a:ext cx="4069080" cy="1779280"/>
+          </a:xfrm>
+          <a:prstGeom prst="rect">
+            <a:avLst/>
+          </a:prstGeom>
+          <a:noFill/>
+          <a:ln w="9525">
+            <a:noFill/>
+            <a:headEnd/>
+            <a:tailEnd/>
+          </a:ln>
+        </p:spPr>
+      </p:pic>
+      <p:sp>
+        <p:nvSpPr>
+          <p:cNvPr id="6" name="Content Placeholder 5"/>
+          <p:cNvSpPr>
+            <a:spLocks noGrp="1"/>
+          </p:cNvSpPr>
+          <p:nvPr>
+            <p:ph idx="4" sz="quarter"/>
+          </p:nvPr>
+        </p:nvSpPr>
+        <p:spPr>
+          <a:xfrm>
+            <a:off x="4617720" y="2970720"/>
+            <a:ext cx="4069080" cy="1779280"/>
+          </a:xfrm>
+        </p:spPr>
+        <p:txBody>
+          <a:bodyPr anchor="ctr"/>
+          <a:lstStyle/>
+          <a:p>
+            <a:pPr lvl="0" indent="0" marL="0">
+              <a:buNone/>
+            </a:pPr>
+            <a:r>
+              <a:rPr b="1"/>
+              <a:t>L3 組織進化路徑</a:t>
+            </a:r>
+          </a:p>
+        </p:txBody>
+      </p:sp>
+    </p:spTree>
+  </p:cSld>
+</p:sld>
+</file>
+
+<file path=ppt/slides/slide9.xml><?xml version="1.0" encoding="utf-8"?>
 <p:sld xmlns:a="http://schemas.openxmlformats.org/drawingml/2006/main" xmlns:r="http://schemas.openxmlformats.org/officeDocument/2006/relationships" xmlns:p="http://schemas.openxmlformats.org/presentationml/2006/main">
   <p:cSld>
     <p:bg>
@@ -6753,288 +7871,6 @@
           <a:chExt cx="0" cy="0"/>
         </a:xfrm>
       </p:grpSpPr>
-    </p:spTree>
-  </p:cSld>
-</p:sld>
-</file>
-
-<file path=ppt/slides/slide7.xml><?xml version="1.0" encoding="utf-8"?>
-<p:sld xmlns:a="http://schemas.openxmlformats.org/drawingml/2006/main" xmlns:r="http://schemas.openxmlformats.org/officeDocument/2006/relationships" xmlns:p="http://schemas.openxmlformats.org/presentationml/2006/main">
-  <p:cSld>
-    <p:bg>
-      <p:bgPr>
-        <a:blipFill dpi="0" rotWithShape="1">
-          <a:blip r:embed="rId3">
-            <a:lum/>
-          </a:blip>
-          <a:srcRect/>
-          <a:stretch>
-            <a:fillRect t="-9000" b="-9000"/>
-          </a:stretch>
-        </a:blipFill>
-        <a:effectsLst/>
-      </p:bgPr>
-    </p:bg>
-    <p:spTree>
-      <p:nvGrpSpPr>
-        <p:cNvPr id="1" name=""/>
-        <p:cNvGrpSpPr/>
-        <p:nvPr/>
-      </p:nvGrpSpPr>
-      <p:grpSpPr>
-        <a:xfrm>
-          <a:off x="0" y="0"/>
-          <a:ext cx="0" cy="0"/>
-          <a:chOff x="0" y="0"/>
-          <a:chExt cx="0" cy="0"/>
-        </a:xfrm>
-      </p:grpSpPr>
-      <p:sp>
-        <p:nvSpPr>
-          <p:cNvPr id="2" name="Title 1"/>
-          <p:cNvSpPr>
-            <a:spLocks noGrp="1"/>
-          </p:cNvSpPr>
-          <p:nvPr>
-            <p:ph type="title"/>
-          </p:nvPr>
-        </p:nvSpPr>
-        <p:spPr/>
-        <p:txBody>
-          <a:bodyPr/>
-          <a:lstStyle/>
-          <a:p>
-            <a:pPr lvl="0" indent="0" marL="0">
-              <a:buNone/>
-            </a:pPr>
-            <a:r>
-              <a:rPr/>
-              <a:t>版面五：背景圖 + 標題</a:t>
-            </a:r>
-          </a:p>
-        </p:txBody>
-      </p:sp>
-      <p:sp>
-        <p:nvSpPr>
-          <p:cNvPr id="3" name="Content Placeholder 2"/>
-          <p:cNvSpPr>
-            <a:spLocks noGrp="1"/>
-          </p:cNvSpPr>
-          <p:nvPr>
-            <p:ph idx="1"/>
-          </p:nvPr>
-        </p:nvSpPr>
-        <p:spPr/>
-        <p:txBody>
-          <a:bodyPr/>
-          <a:lstStyle/>
-          <a:p>
-            <a:pPr lvl="0" indent="0" marL="0">
-              <a:buNone/>
-            </a:pPr>
-            <a:r>
-              <a:rPr b="1"/>
-              <a:t>三層架構 — L1 · L2 · L3</a:t>
-            </a:r>
-          </a:p>
-          <a:p>
-            <a:pPr lvl="0" indent="0" marL="0">
-              <a:buNone/>
-            </a:pPr>
-            <a:r>
-              <a:rPr/>
-              <a:t>從「敢用」到「會用」到「持續進化」</a:t>
-            </a:r>
-          </a:p>
-        </p:txBody>
-      </p:sp>
-    </p:spTree>
-  </p:cSld>
-</p:sld>
-</file>
-
-<file path=ppt/slides/slide8.xml><?xml version="1.0" encoding="utf-8"?>
-<p:sld xmlns:a="http://schemas.openxmlformats.org/drawingml/2006/main" xmlns:r="http://schemas.openxmlformats.org/officeDocument/2006/relationships" xmlns:p="http://schemas.openxmlformats.org/presentationml/2006/main">
-  <p:cSld>
-    <p:spTree>
-      <p:nvGrpSpPr>
-        <p:cNvPr id="1" name=""/>
-        <p:cNvGrpSpPr/>
-        <p:nvPr/>
-      </p:nvGrpSpPr>
-      <p:grpSpPr>
-        <a:xfrm>
-          <a:off x="0" y="0"/>
-          <a:ext cx="0" cy="0"/>
-          <a:chOff x="0" y="0"/>
-          <a:chExt cx="0" cy="0"/>
-        </a:xfrm>
-      </p:grpSpPr>
-      <p:sp>
-        <p:nvSpPr>
-          <p:cNvPr id="2" name="Title 1"/>
-          <p:cNvSpPr>
-            <a:spLocks noGrp="1"/>
-          </p:cNvSpPr>
-          <p:nvPr>
-            <p:ph type="title"/>
-          </p:nvPr>
-        </p:nvSpPr>
-        <p:spPr/>
-        <p:txBody>
-          <a:bodyPr/>
-          <a:lstStyle/>
-          <a:p>
-            <a:pPr lvl="0" indent="0" marL="0">
-              <a:buNone/>
-            </a:pPr>
-            <a:r>
-              <a:rPr/>
-              <a:t>版面對照總結</a:t>
-            </a:r>
-          </a:p>
-        </p:txBody>
-      </p:sp>
-      <p:sp>
-        <p:nvSpPr>
-          <p:cNvPr id="3" name="Content Placeholder 2"/>
-          <p:cNvSpPr>
-            <a:spLocks noGrp="1"/>
-          </p:cNvSpPr>
-          <p:nvPr>
-            <p:ph idx="1" sz="half"/>
-          </p:nvPr>
-        </p:nvSpPr>
-        <p:spPr/>
-        <p:txBody>
-          <a:bodyPr/>
-          <a:lstStyle/>
-          <a:p>
-            <a:pPr lvl="0" indent="0" marL="0">
-              <a:buNone/>
-            </a:pPr>
-            <a:r>
-              <a:rPr b="1"/>
-              <a:t>Pandoc 自動選用的 Layout</a:t>
-            </a:r>
-          </a:p>
-          <a:p>
-            <a:pPr lvl="0"/>
-            <a:r>
-              <a:rPr b="1"/>
-              <a:t>Title and Content</a:t>
-            </a:r>
-            <a:r>
-              <a:rPr/>
-              <a:t> — 純文字條列</a:t>
-            </a:r>
-          </a:p>
-          <a:p>
-            <a:pPr lvl="0"/>
-            <a:r>
-              <a:rPr b="1"/>
-              <a:t>Two Content</a:t>
-            </a:r>
-            <a:r>
-              <a:rPr/>
-              <a:t> — 雙欄純文字</a:t>
-            </a:r>
-          </a:p>
-          <a:p>
-            <a:pPr lvl="0"/>
-            <a:r>
-              <a:rPr b="1"/>
-              <a:t>Comparison</a:t>
-            </a:r>
-            <a:r>
-              <a:rPr/>
-              <a:t> — 雙欄含圖</a:t>
-            </a:r>
-          </a:p>
-          <a:p>
-            <a:pPr lvl="0"/>
-            <a:r>
-              <a:rPr b="1"/>
-              <a:t>Content with Caption</a:t>
-            </a:r>
-            <a:r>
-              <a:rPr/>
-              <a:t> — 文字 + 圖</a:t>
-            </a:r>
-          </a:p>
-          <a:p>
-            <a:pPr lvl="0"/>
-            <a:r>
-              <a:rPr b="1"/>
-              <a:t>Blank</a:t>
-            </a:r>
-            <a:r>
-              <a:rPr/>
-              <a:t> — 背景圖（無標題）</a:t>
-            </a:r>
-          </a:p>
-        </p:txBody>
-      </p:sp>
-      <p:sp>
-        <p:nvSpPr>
-          <p:cNvPr id="4" name="Content Placeholder 3"/>
-          <p:cNvSpPr>
-            <a:spLocks noGrp="1"/>
-          </p:cNvSpPr>
-          <p:nvPr>
-            <p:ph idx="2" sz="half"/>
-          </p:nvPr>
-        </p:nvSpPr>
-        <p:spPr/>
-        <p:txBody>
-          <a:bodyPr/>
-          <a:lstStyle/>
-          <a:p>
-            <a:pPr lvl="0" indent="0" marL="0">
-              <a:buNone/>
-            </a:pPr>
-            <a:r>
-              <a:rPr b="1"/>
-              <a:t>觸發條件</a:t>
-            </a:r>
-          </a:p>
-          <a:p>
-            <a:pPr lvl="0"/>
-            <a:r>
-              <a:rPr/>
-              <a:t>只有文字 → Title and Content</a:t>
-            </a:r>
-          </a:p>
-          <a:p>
-            <a:pPr lvl="0"/>
-            <a:r>
-              <a:rPr/>
-              <a:t>columns + 純文字 → Two Content</a:t>
-            </a:r>
-          </a:p>
-          <a:p>
-            <a:pPr lvl="0"/>
-            <a:r>
-              <a:rPr/>
-              <a:t>columns + 文字+圖 → Comparison</a:t>
-            </a:r>
-          </a:p>
-          <a:p>
-            <a:pPr lvl="0"/>
-            <a:r>
-              <a:rPr/>
-              <a:t>文字後接圖片 → Content with Caption</a:t>
-            </a:r>
-          </a:p>
-          <a:p>
-            <a:pPr lvl="0"/>
-            <a:r>
-              <a:rPr/>
-              <a:t>background-image → Blank 或搭配標題</a:t>
-            </a:r>
-          </a:p>
-        </p:txBody>
-      </p:sp>
     </p:spTree>
   </p:cSld>
 </p:sld>

</xml_diff>